<commit_message>
Updated slide with survey
</commit_message>
<xml_diff>
--- a/slides/BuildingAStaticWebAppWithBlazorAndAzure.pptx
+++ b/slides/BuildingAStaticWebAppWithBlazorAndAzure.pptx
@@ -286,7 +286,7 @@
           <a:p>
             <a:fld id="{7CCA049B-3A46-4BDA-A8F5-2925B00FE570}" type="datetimeFigureOut">
               <a:rPr lang="en-US" smtClean="0"/>
-              <a:t>11/10/2022</a:t>
+              <a:t>11/11/2022</a:t>
             </a:fld>
             <a:endParaRPr lang="en-US" dirty="0"/>
           </a:p>
@@ -451,7 +451,7 @@
           <a:p>
             <a:fld id="{44C46CEC-428A-4DD0-A7C7-21AF8DE33E93}" type="datetimeFigureOut">
               <a:rPr lang="en-US" smtClean="0"/>
-              <a:t>11/10/2022</a:t>
+              <a:t>11/11/2022</a:t>
             </a:fld>
             <a:endParaRPr lang="en-US" dirty="0"/>
           </a:p>
@@ -6261,6 +6261,19 @@
               <a:rPr lang="en-US" dirty="0"/>
               <a:t>Survey</a:t>
             </a:r>
+          </a:p>
+          <a:p>
+            <a:pPr lvl="1"/>
+            <a:r>
+              <a:rPr lang="en-US" dirty="0">
+                <a:hlinkClick r:id="rId6"/>
+              </a:rPr>
+              <a:t>https://forms.office.com/r/qucWfrzpTy</a:t>
+            </a:r>
+            <a:endParaRPr lang="en-US" dirty="0"/>
+          </a:p>
+          <a:p>
+            <a:endParaRPr lang="en-US" dirty="0"/>
           </a:p>
         </p:txBody>
       </p:sp>

</xml_diff>